<commit_message>
Updated Bag Limits module
</commit_message>
<xml_diff>
--- a/modules/MgmntBagLimits/PPT.pptx
+++ b/modules/MgmntBagLimits/PPT.pptx
@@ -3817,11 +3817,7 @@
             <a:pPr lvl="2"/>
             <a:r>
               <a:rPr lang="en-US" dirty="0" smtClean="0"/>
-              <a:t>maximum </a:t>
-            </a:r>
-            <a:r>
-              <a:rPr lang="en-US" dirty="0" smtClean="0"/>
-              <a:t>per day.</a:t>
+              <a:t>maximum per day.</a:t>
             </a:r>
           </a:p>
           <a:p>
@@ -3835,11 +3831,7 @@
             <a:pPr lvl="2"/>
             <a:r>
               <a:rPr lang="en-US" dirty="0" smtClean="0"/>
-              <a:t>maximum </a:t>
-            </a:r>
-            <a:r>
-              <a:rPr lang="en-US" dirty="0" smtClean="0"/>
-              <a:t>in your possession.</a:t>
+              <a:t>maximum in your possession.</a:t>
             </a:r>
           </a:p>
           <a:p>
@@ -3853,11 +3845,7 @@
             <a:pPr lvl="2"/>
             <a:r>
               <a:rPr lang="en-US" dirty="0" smtClean="0"/>
-              <a:t>limited </a:t>
-            </a:r>
-            <a:r>
-              <a:rPr lang="en-US" dirty="0" smtClean="0"/>
-              <a:t>number (usually 1) per season.</a:t>
+              <a:t>limited number (usually 1) per season.</a:t>
             </a:r>
           </a:p>
           <a:p>
@@ -4481,8 +4469,8 @@
         </p:nvSpPr>
         <p:spPr>
           <a:xfrm>
-            <a:off x="457200" y="914400"/>
-            <a:ext cx="8610600" cy="4419600"/>
+            <a:off x="304800" y="914400"/>
+            <a:ext cx="8763000" cy="5410200"/>
           </a:xfrm>
         </p:spPr>
         <p:txBody>
@@ -4491,14 +4479,19 @@
           <a:p>
             <a:r>
               <a:rPr lang="en-US" dirty="0" smtClean="0"/>
-              <a:t>Possible reasons to use.</a:t>
-            </a:r>
+              <a:t>Possible reasons to </a:t>
+            </a:r>
+            <a:r>
+              <a:rPr lang="en-US" dirty="0" smtClean="0"/>
+              <a:t>restrict (be conservative).</a:t>
+            </a:r>
+            <a:endParaRPr lang="en-US" dirty="0" smtClean="0"/>
           </a:p>
           <a:p>
             <a:pPr lvl="1"/>
             <a:r>
-              <a:rPr lang="en-US" dirty="0"/>
-              <a:t>Prevent </a:t>
+              <a:rPr lang="en-US" dirty="0" smtClean="0"/>
+              <a:t>Reduce harvest / prevent </a:t>
             </a:r>
             <a:r>
               <a:rPr lang="en-US" dirty="0" smtClean="0"/>
@@ -4509,15 +4502,49 @@
             <a:pPr lvl="1"/>
             <a:r>
               <a:rPr lang="en-US" dirty="0" smtClean="0"/>
-              <a:t>Equitable division of harvest.</a:t>
+              <a:t>Equitable </a:t>
+            </a:r>
+            <a:r>
+              <a:rPr lang="en-US" dirty="0" smtClean="0"/>
+              <a:t>distribution </a:t>
+            </a:r>
+            <a:r>
+              <a:rPr lang="en-US" dirty="0" smtClean="0"/>
+              <a:t>of harvest.</a:t>
             </a:r>
           </a:p>
           <a:p>
             <a:pPr lvl="1"/>
             <a:r>
               <a:rPr lang="en-US" dirty="0" smtClean="0"/>
-              <a:t>Provide the satisfaction of reaching a goal.</a:t>
-            </a:r>
+              <a:t>Provide the satisfaction of reaching a goal</a:t>
+            </a:r>
+            <a:r>
+              <a:rPr lang="en-US" dirty="0" smtClean="0"/>
+              <a:t>.</a:t>
+            </a:r>
+          </a:p>
+          <a:p>
+            <a:pPr lvl="1"/>
+            <a:r>
+              <a:rPr lang="en-US" dirty="0" smtClean="0"/>
+              <a:t>Remind anglers of finite resource.</a:t>
+            </a:r>
+            <a:endParaRPr lang="en-US" dirty="0" smtClean="0"/>
+          </a:p>
+          <a:p>
+            <a:r>
+              <a:rPr lang="en-US" dirty="0" smtClean="0"/>
+              <a:t>Possible reasons to liberalize</a:t>
+            </a:r>
+          </a:p>
+          <a:p>
+            <a:pPr lvl="1"/>
+            <a:r>
+              <a:rPr lang="en-US" dirty="0" smtClean="0"/>
+              <a:t>Encourage removal (of undesirable fish).</a:t>
+            </a:r>
+            <a:endParaRPr lang="en-US" dirty="0" smtClean="0"/>
           </a:p>
           <a:p>
             <a:endParaRPr lang="en-US" sz="1400" dirty="0" smtClean="0"/>
@@ -4525,7 +4552,15 @@
           <a:p>
             <a:r>
               <a:rPr lang="en-US" dirty="0" smtClean="0"/>
-              <a:t>Recommended when …</a:t>
+              <a:t>Recommend </a:t>
+            </a:r>
+            <a:r>
+              <a:rPr lang="en-US" smtClean="0"/>
+              <a:t>lower limits </a:t>
+            </a:r>
+            <a:r>
+              <a:rPr lang="en-US" dirty="0" smtClean="0"/>
+              <a:t>when …</a:t>
             </a:r>
           </a:p>
           <a:p>
@@ -4534,24 +4569,6 @@
               <a:rPr lang="en-US" dirty="0" smtClean="0"/>
               <a:t>High rates of fishing mortality.</a:t>
             </a:r>
-          </a:p>
-          <a:p>
-            <a:endParaRPr lang="en-US" sz="1400" dirty="0" smtClean="0">
-              <a:hlinkClick r:id="rId3"/>
-            </a:endParaRPr>
-          </a:p>
-          <a:p>
-            <a:r>
-              <a:rPr lang="en-US" dirty="0" smtClean="0">
-                <a:hlinkClick r:id="rId3"/>
-              </a:rPr>
-              <a:t>Check this out</a:t>
-            </a:r>
-            <a:r>
-              <a:rPr lang="en-US" dirty="0" smtClean="0"/>
-              <a:t>.</a:t>
-            </a:r>
-            <a:endParaRPr lang="en-US" dirty="0" smtClean="0"/>
           </a:p>
         </p:txBody>
       </p:sp>
@@ -4756,6 +4773,37 @@
                                   </p:childTnLst>
                                 </p:cTn>
                               </p:par>
+                              <p:par>
+                                <p:cTn id="15" presetID="1" presetClass="entr" presetSubtype="0" fill="hold" grpId="0" nodeType="withEffect">
+                                  <p:stCondLst>
+                                    <p:cond delay="0"/>
+                                  </p:stCondLst>
+                                  <p:childTnLst>
+                                    <p:set>
+                                      <p:cBhvr>
+                                        <p:cTn id="16" dur="1" fill="hold">
+                                          <p:stCondLst>
+                                            <p:cond delay="0"/>
+                                          </p:stCondLst>
+                                        </p:cTn>
+                                        <p:tgtEl>
+                                          <p:spTgt spid="3">
+                                            <p:txEl>
+                                              <p:pRg st="4" end="4"/>
+                                            </p:txEl>
+                                          </p:spTgt>
+                                        </p:tgtEl>
+                                        <p:attrNameLst>
+                                          <p:attrName>style.visibility</p:attrName>
+                                        </p:attrNameLst>
+                                      </p:cBhvr>
+                                      <p:to>
+                                        <p:strVal val="visible"/>
+                                      </p:to>
+                                    </p:set>
+                                  </p:childTnLst>
+                                </p:cTn>
+                              </p:par>
                             </p:childTnLst>
                           </p:cTn>
                         </p:par>
@@ -4763,26 +4811,26 @@
                     </p:cTn>
                   </p:par>
                   <p:par>
-                    <p:cTn id="15" fill="hold">
+                    <p:cTn id="17" fill="hold">
                       <p:stCondLst>
                         <p:cond delay="indefinite"/>
                       </p:stCondLst>
                       <p:childTnLst>
                         <p:par>
-                          <p:cTn id="16" fill="hold">
+                          <p:cTn id="18" fill="hold">
                             <p:stCondLst>
                               <p:cond delay="0"/>
                             </p:stCondLst>
                             <p:childTnLst>
                               <p:par>
-                                <p:cTn id="17" presetID="1" presetClass="entr" presetSubtype="0" fill="hold" grpId="0" nodeType="clickEffect">
+                                <p:cTn id="19" presetID="1" presetClass="entr" presetSubtype="0" fill="hold" grpId="0" nodeType="clickEffect">
                                   <p:stCondLst>
                                     <p:cond delay="0"/>
                                   </p:stCondLst>
                                   <p:childTnLst>
                                     <p:set>
                                       <p:cBhvr>
-                                        <p:cTn id="18" dur="1" fill="hold">
+                                        <p:cTn id="20" dur="1" fill="hold">
                                           <p:stCondLst>
                                             <p:cond delay="0"/>
                                           </p:stCondLst>
@@ -4806,14 +4854,14 @@
                                 </p:cTn>
                               </p:par>
                               <p:par>
-                                <p:cTn id="19" presetID="1" presetClass="entr" presetSubtype="0" fill="hold" grpId="0" nodeType="withEffect">
+                                <p:cTn id="21" presetID="1" presetClass="entr" presetSubtype="0" fill="hold" grpId="0" nodeType="withEffect">
                                   <p:stCondLst>
                                     <p:cond delay="0"/>
                                   </p:stCondLst>
                                   <p:childTnLst>
                                     <p:set>
                                       <p:cBhvr>
-                                        <p:cTn id="20" dur="1" fill="hold">
+                                        <p:cTn id="22" dur="1" fill="hold">
                                           <p:stCondLst>
                                             <p:cond delay="0"/>
                                           </p:stCondLst>
@@ -4843,26 +4891,26 @@
                     </p:cTn>
                   </p:par>
                   <p:par>
-                    <p:cTn id="21" fill="hold">
+                    <p:cTn id="23" fill="hold">
                       <p:stCondLst>
                         <p:cond delay="indefinite"/>
                       </p:stCondLst>
                       <p:childTnLst>
                         <p:par>
-                          <p:cTn id="22" fill="hold">
+                          <p:cTn id="24" fill="hold">
                             <p:stCondLst>
                               <p:cond delay="0"/>
                             </p:stCondLst>
                             <p:childTnLst>
                               <p:par>
-                                <p:cTn id="23" presetID="1" presetClass="entr" presetSubtype="0" fill="hold" grpId="0" nodeType="clickEffect">
+                                <p:cTn id="25" presetID="1" presetClass="entr" presetSubtype="0" fill="hold" grpId="0" nodeType="clickEffect">
                                   <p:stCondLst>
                                     <p:cond delay="0"/>
                                   </p:stCondLst>
                                   <p:childTnLst>
                                     <p:set>
                                       <p:cBhvr>
-                                        <p:cTn id="24" dur="1" fill="hold">
+                                        <p:cTn id="26" dur="1" fill="hold">
                                           <p:stCondLst>
                                             <p:cond delay="0"/>
                                           </p:stCondLst>
@@ -4871,6 +4919,37 @@
                                           <p:spTgt spid="3">
                                             <p:txEl>
                                               <p:pRg st="8" end="8"/>
+                                            </p:txEl>
+                                          </p:spTgt>
+                                        </p:tgtEl>
+                                        <p:attrNameLst>
+                                          <p:attrName>style.visibility</p:attrName>
+                                        </p:attrNameLst>
+                                      </p:cBhvr>
+                                      <p:to>
+                                        <p:strVal val="visible"/>
+                                      </p:to>
+                                    </p:set>
+                                  </p:childTnLst>
+                                </p:cTn>
+                              </p:par>
+                              <p:par>
+                                <p:cTn id="27" presetID="1" presetClass="entr" presetSubtype="0" fill="hold" grpId="0" nodeType="withEffect">
+                                  <p:stCondLst>
+                                    <p:cond delay="0"/>
+                                  </p:stCondLst>
+                                  <p:childTnLst>
+                                    <p:set>
+                                      <p:cBhvr>
+                                        <p:cTn id="28" dur="1" fill="hold">
+                                          <p:stCondLst>
+                                            <p:cond delay="0"/>
+                                          </p:stCondLst>
+                                        </p:cTn>
+                                        <p:tgtEl>
+                                          <p:spTgt spid="3">
+                                            <p:txEl>
+                                              <p:pRg st="9" end="9"/>
                                             </p:txEl>
                                           </p:spTgt>
                                         </p:tgtEl>

</xml_diff>